<commit_message>
work on 04 diabetes example
</commit_message>
<xml_diff>
--- a/images/pca-rotation.pptx
+++ b/images/pca-rotation.pptx
@@ -208,7 +208,7 @@
           <a:p>
             <a:fld id="{B7738961-0665-4DD2-977A-4AD75B6365FB}" type="datetimeFigureOut">
               <a:rPr lang="en-CA" smtClean="0"/>
-              <a:t>2023-12-07</a:t>
+              <a:t>2024-04-06</a:t>
             </a:fld>
             <a:endParaRPr lang="en-CA"/>
           </a:p>
@@ -709,7 +709,7 @@
           <a:p>
             <a:fld id="{BC3868B9-DAD5-4B3C-967E-589FA8486F78}" type="datetimeFigureOut">
               <a:rPr lang="en-CA" smtClean="0"/>
-              <a:t>2023-12-07</a:t>
+              <a:t>2024-04-06</a:t>
             </a:fld>
             <a:endParaRPr lang="en-CA"/>
           </a:p>
@@ -909,7 +909,7 @@
           <a:p>
             <a:fld id="{BC3868B9-DAD5-4B3C-967E-589FA8486F78}" type="datetimeFigureOut">
               <a:rPr lang="en-CA" smtClean="0"/>
-              <a:t>2023-12-07</a:t>
+              <a:t>2024-04-06</a:t>
             </a:fld>
             <a:endParaRPr lang="en-CA"/>
           </a:p>
@@ -1119,7 +1119,7 @@
           <a:p>
             <a:fld id="{BC3868B9-DAD5-4B3C-967E-589FA8486F78}" type="datetimeFigureOut">
               <a:rPr lang="en-CA" smtClean="0"/>
-              <a:t>2023-12-07</a:t>
+              <a:t>2024-04-06</a:t>
             </a:fld>
             <a:endParaRPr lang="en-CA"/>
           </a:p>
@@ -1319,7 +1319,7 @@
           <a:p>
             <a:fld id="{BC3868B9-DAD5-4B3C-967E-589FA8486F78}" type="datetimeFigureOut">
               <a:rPr lang="en-CA" smtClean="0"/>
-              <a:t>2023-12-07</a:t>
+              <a:t>2024-04-06</a:t>
             </a:fld>
             <a:endParaRPr lang="en-CA"/>
           </a:p>
@@ -1595,7 +1595,7 @@
           <a:p>
             <a:fld id="{BC3868B9-DAD5-4B3C-967E-589FA8486F78}" type="datetimeFigureOut">
               <a:rPr lang="en-CA" smtClean="0"/>
-              <a:t>2023-12-07</a:t>
+              <a:t>2024-04-06</a:t>
             </a:fld>
             <a:endParaRPr lang="en-CA"/>
           </a:p>
@@ -1863,7 +1863,7 @@
           <a:p>
             <a:fld id="{BC3868B9-DAD5-4B3C-967E-589FA8486F78}" type="datetimeFigureOut">
               <a:rPr lang="en-CA" smtClean="0"/>
-              <a:t>2023-12-07</a:t>
+              <a:t>2024-04-06</a:t>
             </a:fld>
             <a:endParaRPr lang="en-CA"/>
           </a:p>
@@ -2278,7 +2278,7 @@
           <a:p>
             <a:fld id="{BC3868B9-DAD5-4B3C-967E-589FA8486F78}" type="datetimeFigureOut">
               <a:rPr lang="en-CA" smtClean="0"/>
-              <a:t>2023-12-07</a:t>
+              <a:t>2024-04-06</a:t>
             </a:fld>
             <a:endParaRPr lang="en-CA"/>
           </a:p>
@@ -2420,7 +2420,7 @@
           <a:p>
             <a:fld id="{BC3868B9-DAD5-4B3C-967E-589FA8486F78}" type="datetimeFigureOut">
               <a:rPr lang="en-CA" smtClean="0"/>
-              <a:t>2023-12-07</a:t>
+              <a:t>2024-04-06</a:t>
             </a:fld>
             <a:endParaRPr lang="en-CA"/>
           </a:p>
@@ -2533,7 +2533,7 @@
           <a:p>
             <a:fld id="{BC3868B9-DAD5-4B3C-967E-589FA8486F78}" type="datetimeFigureOut">
               <a:rPr lang="en-CA" smtClean="0"/>
-              <a:t>2023-12-07</a:t>
+              <a:t>2024-04-06</a:t>
             </a:fld>
             <a:endParaRPr lang="en-CA"/>
           </a:p>
@@ -2846,7 +2846,7 @@
           <a:p>
             <a:fld id="{BC3868B9-DAD5-4B3C-967E-589FA8486F78}" type="datetimeFigureOut">
               <a:rPr lang="en-CA" smtClean="0"/>
-              <a:t>2023-12-07</a:t>
+              <a:t>2024-04-06</a:t>
             </a:fld>
             <a:endParaRPr lang="en-CA"/>
           </a:p>
@@ -3135,7 +3135,7 @@
           <a:p>
             <a:fld id="{BC3868B9-DAD5-4B3C-967E-589FA8486F78}" type="datetimeFigureOut">
               <a:rPr lang="en-CA" smtClean="0"/>
-              <a:t>2023-12-07</a:t>
+              <a:t>2024-04-06</a:t>
             </a:fld>
             <a:endParaRPr lang="en-CA"/>
           </a:p>
@@ -3378,7 +3378,7 @@
           <a:p>
             <a:fld id="{BC3868B9-DAD5-4B3C-967E-589FA8486F78}" type="datetimeFigureOut">
               <a:rPr lang="en-CA" smtClean="0"/>
-              <a:t>2023-12-07</a:t>
+              <a:t>2024-04-06</a:t>
             </a:fld>
             <a:endParaRPr lang="en-CA"/>
           </a:p>
@@ -4093,7 +4093,7 @@
                           <m:ctrlPr>
                             <a:rPr lang="en-CA" altLang="en-US" sz="1200" b="0" i="1" smtClean="0">
                               <a:solidFill>
-                                <a:srgbClr val="FF0000"/>
+                                <a:schemeClr val="tx1"/>
                               </a:solidFill>
                               <a:latin typeface="Cambria Math" panose="02040503050406030204" pitchFamily="18" charset="0"/>
                               <a:ea typeface="Cambria Math" panose="02040503050406030204" pitchFamily="18" charset="0"/>
@@ -4107,7 +4107,7 @@
                               <m:ctrlPr>
                                 <a:rPr lang="en-CA" altLang="en-US" sz="1200" b="0" i="1" smtClean="0">
                                   <a:solidFill>
-                                    <a:srgbClr val="FF0000"/>
+                                    <a:schemeClr val="tx1"/>
                                   </a:solidFill>
                                   <a:latin typeface="Cambria Math" panose="02040503050406030204" pitchFamily="18" charset="0"/>
                                   <a:ea typeface="Cambria Math" panose="02040503050406030204" pitchFamily="18" charset="0"/>
@@ -4118,7 +4118,7 @@
                               <m:r>
                                 <a:rPr lang="en-CA" altLang="en-US" sz="1200" b="0" i="1" smtClean="0">
                                   <a:solidFill>
-                                    <a:srgbClr val="FF0000"/>
+                                    <a:schemeClr val="tx1"/>
                                   </a:solidFill>
                                   <a:latin typeface="Cambria Math" panose="02040503050406030204" pitchFamily="18" charset="0"/>
                                   <a:ea typeface="Cambria Math" panose="02040503050406030204" pitchFamily="18" charset="0"/>
@@ -4130,7 +4130,7 @@
                               <m:r>
                                 <a:rPr lang="en-CA" altLang="en-US" sz="1200" b="0" i="1" smtClean="0">
                                   <a:solidFill>
-                                    <a:srgbClr val="FF0000"/>
+                                    <a:schemeClr val="tx1"/>
                                   </a:solidFill>
                                   <a:latin typeface="Cambria Math" panose="02040503050406030204" pitchFamily="18" charset="0"/>
                                   <a:ea typeface="Cambria Math" panose="02040503050406030204" pitchFamily="18" charset="0"/>
@@ -4312,7 +4312,7 @@
                           <m:ctrlPr>
                             <a:rPr lang="en-CA" altLang="en-US" sz="1200" b="0" i="1" smtClean="0">
                               <a:solidFill>
-                                <a:srgbClr val="FF0000"/>
+                                <a:schemeClr val="tx1"/>
                               </a:solidFill>
                               <a:latin typeface="Cambria Math" panose="02040503050406030204" pitchFamily="18" charset="0"/>
                               <a:ea typeface="Cambria Math" panose="02040503050406030204" pitchFamily="18" charset="0"/>
@@ -4326,7 +4326,7 @@
                               <m:ctrlPr>
                                 <a:rPr lang="en-CA" altLang="en-US" sz="1200" b="0" i="1" smtClean="0">
                                   <a:solidFill>
-                                    <a:srgbClr val="FF0000"/>
+                                    <a:schemeClr val="tx1"/>
                                   </a:solidFill>
                                   <a:latin typeface="Cambria Math" panose="02040503050406030204" pitchFamily="18" charset="0"/>
                                   <a:ea typeface="Cambria Math" panose="02040503050406030204" pitchFamily="18" charset="0"/>
@@ -4337,7 +4337,7 @@
                               <m:r>
                                 <a:rPr lang="en-CA" altLang="en-US" sz="1200" b="0" i="1" smtClean="0">
                                   <a:solidFill>
-                                    <a:srgbClr val="FF0000"/>
+                                    <a:schemeClr val="tx1"/>
                                   </a:solidFill>
                                   <a:latin typeface="Cambria Math" panose="02040503050406030204" pitchFamily="18" charset="0"/>
                                   <a:ea typeface="Cambria Math" panose="02040503050406030204" pitchFamily="18" charset="0"/>
@@ -4349,7 +4349,7 @@
                               <m:r>
                                 <a:rPr lang="en-CA" altLang="en-US" sz="1200" b="0" i="1" smtClean="0">
                                   <a:solidFill>
-                                    <a:srgbClr val="FF0000"/>
+                                    <a:schemeClr val="tx1"/>
                                   </a:solidFill>
                                   <a:latin typeface="Cambria Math" panose="02040503050406030204" pitchFamily="18" charset="0"/>
                                   <a:ea typeface="Cambria Math" panose="02040503050406030204" pitchFamily="18" charset="0"/>
@@ -5132,7 +5132,7 @@
                           <m:ctrlPr>
                             <a:rPr lang="en-CA" altLang="en-US" sz="1200" b="0" i="1" smtClean="0">
                               <a:solidFill>
-                                <a:srgbClr val="FF0000"/>
+                                <a:schemeClr val="tx1"/>
                               </a:solidFill>
                               <a:latin typeface="Cambria Math" panose="02040503050406030204" pitchFamily="18" charset="0"/>
                               <a:ea typeface="Cambria Math" panose="02040503050406030204" pitchFamily="18" charset="0"/>
@@ -5146,7 +5146,7 @@
                               <m:ctrlPr>
                                 <a:rPr lang="en-CA" altLang="en-US" sz="1200" b="0" i="1" smtClean="0">
                                   <a:solidFill>
-                                    <a:srgbClr val="FF0000"/>
+                                    <a:schemeClr val="tx1"/>
                                   </a:solidFill>
                                   <a:latin typeface="Cambria Math" panose="02040503050406030204" pitchFamily="18" charset="0"/>
                                   <a:ea typeface="Cambria Math" panose="02040503050406030204" pitchFamily="18" charset="0"/>
@@ -5157,7 +5157,7 @@
                               <m:r>
                                 <a:rPr lang="en-CA" altLang="en-US" sz="1200" b="0" i="1" smtClean="0">
                                   <a:solidFill>
-                                    <a:srgbClr val="FF0000"/>
+                                    <a:schemeClr val="tx1"/>
                                   </a:solidFill>
                                   <a:latin typeface="Cambria Math" panose="02040503050406030204" pitchFamily="18" charset="0"/>
                                   <a:ea typeface="Cambria Math" panose="02040503050406030204" pitchFamily="18" charset="0"/>
@@ -5169,7 +5169,7 @@
                               <m:r>
                                 <a:rPr lang="en-CA" altLang="en-US" sz="1200" b="0" i="1" smtClean="0">
                                   <a:solidFill>
-                                    <a:srgbClr val="FF0000"/>
+                                    <a:schemeClr val="tx1"/>
                                   </a:solidFill>
                                   <a:latin typeface="Cambria Math" panose="02040503050406030204" pitchFamily="18" charset="0"/>
                                   <a:ea typeface="Cambria Math" panose="02040503050406030204" pitchFamily="18" charset="0"/>
@@ -5351,7 +5351,7 @@
                           <m:ctrlPr>
                             <a:rPr lang="en-CA" altLang="en-US" sz="1200" b="0" i="1" smtClean="0">
                               <a:solidFill>
-                                <a:srgbClr val="FF0000"/>
+                                <a:schemeClr val="tx1"/>
                               </a:solidFill>
                               <a:latin typeface="Cambria Math" panose="02040503050406030204" pitchFamily="18" charset="0"/>
                               <a:ea typeface="Cambria Math" panose="02040503050406030204" pitchFamily="18" charset="0"/>
@@ -5365,7 +5365,7 @@
                               <m:ctrlPr>
                                 <a:rPr lang="en-CA" altLang="en-US" sz="1200" b="0" i="1" smtClean="0">
                                   <a:solidFill>
-                                    <a:srgbClr val="FF0000"/>
+                                    <a:schemeClr val="tx1"/>
                                   </a:solidFill>
                                   <a:latin typeface="Cambria Math" panose="02040503050406030204" pitchFamily="18" charset="0"/>
                                   <a:ea typeface="Cambria Math" panose="02040503050406030204" pitchFamily="18" charset="0"/>
@@ -5376,7 +5376,7 @@
                               <m:r>
                                 <a:rPr lang="en-CA" altLang="en-US" sz="1200" b="0" i="1" smtClean="0">
                                   <a:solidFill>
-                                    <a:srgbClr val="FF0000"/>
+                                    <a:schemeClr val="tx1"/>
                                   </a:solidFill>
                                   <a:latin typeface="Cambria Math" panose="02040503050406030204" pitchFamily="18" charset="0"/>
                                   <a:ea typeface="Cambria Math" panose="02040503050406030204" pitchFamily="18" charset="0"/>
@@ -5388,7 +5388,7 @@
                               <m:r>
                                 <a:rPr lang="en-CA" altLang="en-US" sz="1200" b="0" i="1" smtClean="0">
                                   <a:solidFill>
-                                    <a:srgbClr val="FF0000"/>
+                                    <a:schemeClr val="tx1"/>
                                   </a:solidFill>
                                   <a:latin typeface="Cambria Math" panose="02040503050406030204" pitchFamily="18" charset="0"/>
                                   <a:ea typeface="Cambria Math" panose="02040503050406030204" pitchFamily="18" charset="0"/>

</xml_diff>